<commit_message>
Initial draft for week 3 now complete. 3 more lecture to go.
</commit_message>
<xml_diff>
--- a/Lecture 7 - Cat LM/slides/LM with cat interpretation.pptx
+++ b/Lecture 7 - Cat LM/slides/LM with cat interpretation.pptx
@@ -124,6 +124,11 @@
       </a:defRPr>
     </a:lvl9pPr>
   </p:defaultTextStyle>
+  <p:extLst>
+    <p:ext uri="{EFAFB233-063F-42B5-8137-9DF3F51BA10A}">
+      <p15:sldGuideLst xmlns:p15="http://schemas.microsoft.com/office/powerpoint/2012/main"/>
+    </p:ext>
+  </p:extLst>
 </p:presentation>
 </file>
 
@@ -468,7 +473,7 @@
           <a:p>
             <a:fld id="{D8644561-F434-46E9-9D5F-467389065464}" type="datetimeFigureOut">
               <a:rPr lang="en-GB" smtClean="0"/>
-              <a:t>23/07/2024</a:t>
+              <a:t>24/07/2024</a:t>
             </a:fld>
             <a:endParaRPr lang="en-GB"/>
           </a:p>
@@ -678,7 +683,7 @@
           <a:p>
             <a:fld id="{D8644561-F434-46E9-9D5F-467389065464}" type="datetimeFigureOut">
               <a:rPr lang="en-GB" smtClean="0"/>
-              <a:t>23/07/2024</a:t>
+              <a:t>24/07/2024</a:t>
             </a:fld>
             <a:endParaRPr lang="en-GB"/>
           </a:p>
@@ -900,7 +905,7 @@
           <a:p>
             <a:fld id="{D8644561-F434-46E9-9D5F-467389065464}" type="datetimeFigureOut">
               <a:rPr lang="en-GB" smtClean="0"/>
-              <a:t>23/07/2024</a:t>
+              <a:t>24/07/2024</a:t>
             </a:fld>
             <a:endParaRPr lang="en-GB"/>
           </a:p>
@@ -1839,7 +1844,7 @@
           <a:p>
             <a:fld id="{D8644561-F434-46E9-9D5F-467389065464}" type="datetimeFigureOut">
               <a:rPr lang="en-GB" smtClean="0"/>
-              <a:t>23/07/2024</a:t>
+              <a:t>24/07/2024</a:t>
             </a:fld>
             <a:endParaRPr lang="en-GB"/>
           </a:p>
@@ -1981,7 +1986,7 @@
           <a:p>
             <a:fld id="{D8644561-F434-46E9-9D5F-467389065464}" type="datetimeFigureOut">
               <a:rPr lang="en-GB" smtClean="0"/>
-              <a:t>23/07/2024</a:t>
+              <a:t>24/07/2024</a:t>
             </a:fld>
             <a:endParaRPr lang="en-GB"/>
           </a:p>
@@ -2094,7 +2099,7 @@
           <a:p>
             <a:fld id="{D8644561-F434-46E9-9D5F-467389065464}" type="datetimeFigureOut">
               <a:rPr lang="en-GB" smtClean="0"/>
-              <a:t>23/07/2024</a:t>
+              <a:t>24/07/2024</a:t>
             </a:fld>
             <a:endParaRPr lang="en-GB"/>
           </a:p>
@@ -2407,7 +2412,7 @@
           <a:p>
             <a:fld id="{D8644561-F434-46E9-9D5F-467389065464}" type="datetimeFigureOut">
               <a:rPr lang="en-GB" smtClean="0"/>
-              <a:t>23/07/2024</a:t>
+              <a:t>24/07/2024</a:t>
             </a:fld>
             <a:endParaRPr lang="en-GB"/>
           </a:p>
@@ -2700,7 +2705,7 @@
           <a:p>
             <a:fld id="{D8644561-F434-46E9-9D5F-467389065464}" type="datetimeFigureOut">
               <a:rPr lang="en-GB" smtClean="0"/>
-              <a:t>23/07/2024</a:t>
+              <a:t>24/07/2024</a:t>
             </a:fld>
             <a:endParaRPr lang="en-GB"/>
           </a:p>
@@ -2943,7 +2948,7 @@
           <a:p>
             <a:fld id="{D8644561-F434-46E9-9D5F-467389065464}" type="datetimeFigureOut">
               <a:rPr lang="en-GB" smtClean="0"/>
-              <a:t>23/07/2024</a:t>
+              <a:t>24/07/2024</a:t>
             </a:fld>
             <a:endParaRPr lang="en-GB"/>
           </a:p>
@@ -3490,8 +3495,8 @@
           </a:p>
         </p:txBody>
       </p:sp>
-      <mc:AlternateContent xmlns:mc="http://schemas.openxmlformats.org/markup-compatibility/2006">
-        <mc:Choice xmlns:a14="http://schemas.microsoft.com/office/drawing/2010/main" Requires="a14">
+      <mc:AlternateContent xmlns:mc="http://schemas.openxmlformats.org/markup-compatibility/2006" xmlns:a14="http://schemas.microsoft.com/office/drawing/2010/main">
+        <mc:Choice Requires="a14">
           <p:sp>
             <p:nvSpPr>
               <p:cNvPr id="3" name="Content Placeholder 2">
@@ -3652,7 +3657,7 @@
             </p:txBody>
           </p:sp>
         </mc:Choice>
-        <mc:Fallback>
+        <mc:Fallback xmlns="">
           <p:sp>
             <p:nvSpPr>
               <p:cNvPr id="3" name="Content Placeholder 2">
@@ -6301,8 +6306,8 @@
           </a:p>
         </p:txBody>
       </p:sp>
-      <mc:AlternateContent xmlns:mc="http://schemas.openxmlformats.org/markup-compatibility/2006">
-        <mc:Choice xmlns:a14="http://schemas.microsoft.com/office/drawing/2010/main" Requires="a14">
+      <mc:AlternateContent xmlns:mc="http://schemas.openxmlformats.org/markup-compatibility/2006" xmlns:a14="http://schemas.microsoft.com/office/drawing/2010/main">
+        <mc:Choice Requires="a14">
           <p:sp>
             <p:nvSpPr>
               <p:cNvPr id="4" name="TextBox 3">
@@ -6428,7 +6433,7 @@
             </p:txBody>
           </p:sp>
         </mc:Choice>
-        <mc:Fallback>
+        <mc:Fallback xmlns="">
           <p:sp>
             <p:nvSpPr>
               <p:cNvPr id="4" name="TextBox 3">
@@ -6826,8 +6831,8 @@
           </a:p>
         </p:txBody>
       </p:sp>
-      <mc:AlternateContent xmlns:mc="http://schemas.openxmlformats.org/markup-compatibility/2006">
-        <mc:Choice xmlns:a14="http://schemas.microsoft.com/office/drawing/2010/main" Requires="a14">
+      <mc:AlternateContent xmlns:mc="http://schemas.openxmlformats.org/markup-compatibility/2006" xmlns:a14="http://schemas.microsoft.com/office/drawing/2010/main">
+        <mc:Choice Requires="a14">
           <p:sp>
             <p:nvSpPr>
               <p:cNvPr id="20" name="Content Placeholder 2">
@@ -7217,7 +7222,7 @@
             </p:txBody>
           </p:sp>
         </mc:Choice>
-        <mc:Fallback>
+        <mc:Fallback xmlns="">
           <p:sp>
             <p:nvSpPr>
               <p:cNvPr id="20" name="Content Placeholder 2">
@@ -7566,8 +7571,8 @@
           </a:p>
         </p:txBody>
       </p:sp>
-      <mc:AlternateContent xmlns:mc="http://schemas.openxmlformats.org/markup-compatibility/2006">
-        <mc:Choice xmlns:a14="http://schemas.microsoft.com/office/drawing/2010/main" Requires="a14">
+      <mc:AlternateContent xmlns:mc="http://schemas.openxmlformats.org/markup-compatibility/2006" xmlns:a14="http://schemas.microsoft.com/office/drawing/2010/main">
+        <mc:Choice Requires="a14">
           <p:sp>
             <p:nvSpPr>
               <p:cNvPr id="4" name="TextBox 3">
@@ -7631,7 +7636,7 @@
             </p:txBody>
           </p:sp>
         </mc:Choice>
-        <mc:Fallback>
+        <mc:Fallback xmlns="">
           <p:sp>
             <p:nvSpPr>
               <p:cNvPr id="4" name="TextBox 3">
@@ -8669,8 +8674,8 @@
           </a:p>
         </p:txBody>
       </p:sp>
-      <mc:AlternateContent xmlns:mc="http://schemas.openxmlformats.org/markup-compatibility/2006">
-        <mc:Choice xmlns:a14="http://schemas.microsoft.com/office/drawing/2010/main" Requires="a14">
+      <mc:AlternateContent xmlns:mc="http://schemas.openxmlformats.org/markup-compatibility/2006" xmlns:a14="http://schemas.microsoft.com/office/drawing/2010/main">
+        <mc:Choice Requires="a14">
           <p:sp>
             <p:nvSpPr>
               <p:cNvPr id="4" name="TextBox 3">
@@ -8699,6 +8704,7 @@
               </a:bodyPr>
               <a:lstStyle/>
               <a:p>
+                <a:pPr/>
                 <a14:m>
                   <m:oMathPara xmlns:m="http://schemas.openxmlformats.org/officeDocument/2006/math">
                     <m:oMathParaPr>
@@ -8731,7 +8737,7 @@
             </p:txBody>
           </p:sp>
         </mc:Choice>
-        <mc:Fallback>
+        <mc:Fallback xmlns="">
           <p:sp>
             <p:nvSpPr>
               <p:cNvPr id="4" name="TextBox 3">
@@ -9557,7 +9563,7 @@
               <a:blipFill>
                 <a:blip r:embed="rId4"/>
                 <a:stretch>
-                  <a:fillRect l="-746" t="-11304" b="-36087"/>
+                  <a:fillRect l="-647" t="-11304" b="-6087"/>
                 </a:stretch>
               </a:blipFill>
             </p:spPr>
@@ -12317,7 +12323,7 @@
           <a:p>
             <a:r>
               <a:rPr lang="en-GB" dirty="0"/>
-              <a:t>Actually fitting models in R is easy</a:t>
+              <a:t>Fitting models in R is easy</a:t>
             </a:r>
           </a:p>
           <a:p>
@@ -12412,7 +12418,7 @@
               <a:rPr lang="en-GB" dirty="0">
                 <a:cs typeface="Courier New" panose="02070309020205020404" pitchFamily="49" charset="0"/>
               </a:rPr>
-              <a:t> to generate fitted values</a:t>
+              <a:t> to generate fitted values &amp; standard errors of fit</a:t>
             </a:r>
           </a:p>
           <a:p>
@@ -12421,7 +12427,16 @@
               <a:rPr lang="en-GB" dirty="0">
                 <a:cs typeface="Courier New" panose="02070309020205020404" pitchFamily="49" charset="0"/>
               </a:rPr>
-              <a:t>Plot them using your software of preference</a:t>
+              <a:t>Convert standard errors to 95% CI</a:t>
+            </a:r>
+          </a:p>
+          <a:p>
+            <a:pPr lvl="1"/>
+            <a:r>
+              <a:rPr lang="en-GB" dirty="0">
+                <a:cs typeface="Courier New" panose="02070309020205020404" pitchFamily="49" charset="0"/>
+              </a:rPr>
+              <a:t>Plot them</a:t>
             </a:r>
           </a:p>
           <a:p>

</xml_diff>